<commit_message>
Added game Should have added it sooner Currently Moves all four directions Can breath fire timer to delete fire once done
</commit_message>
<xml_diff>
--- a/Proposal.pptx
+++ b/Proposal.pptx
@@ -311,7 +311,7 @@
             <a:fld id="{1D8BD707-D9CF-40AE-B4C6-C98DA3205C09}" type="datetimeFigureOut">
               <a:rPr lang="en-US" smtClean="0"/>
               <a:pPr/>
-              <a:t>10/3/2017</a:t>
+              <a:t>10/9/2017</a:t>
             </a:fld>
             <a:endParaRPr lang="en-US"/>
           </a:p>
@@ -476,7 +476,7 @@
             <a:fld id="{1D8BD707-D9CF-40AE-B4C6-C98DA3205C09}" type="datetimeFigureOut">
               <a:rPr lang="en-US" smtClean="0"/>
               <a:pPr/>
-              <a:t>10/3/2017</a:t>
+              <a:t>10/9/2017</a:t>
             </a:fld>
             <a:endParaRPr lang="en-US"/>
           </a:p>
@@ -651,7 +651,7 @@
             <a:fld id="{1D8BD707-D9CF-40AE-B4C6-C98DA3205C09}" type="datetimeFigureOut">
               <a:rPr lang="en-US" smtClean="0"/>
               <a:pPr/>
-              <a:t>10/3/2017</a:t>
+              <a:t>10/9/2017</a:t>
             </a:fld>
             <a:endParaRPr lang="en-US"/>
           </a:p>
@@ -816,7 +816,7 @@
             <a:fld id="{1D8BD707-D9CF-40AE-B4C6-C98DA3205C09}" type="datetimeFigureOut">
               <a:rPr lang="en-US" smtClean="0"/>
               <a:pPr/>
-              <a:t>10/3/2017</a:t>
+              <a:t>10/9/2017</a:t>
             </a:fld>
             <a:endParaRPr lang="en-US"/>
           </a:p>
@@ -1058,7 +1058,7 @@
             <a:fld id="{1D8BD707-D9CF-40AE-B4C6-C98DA3205C09}" type="datetimeFigureOut">
               <a:rPr lang="en-US" smtClean="0"/>
               <a:pPr/>
-              <a:t>10/3/2017</a:t>
+              <a:t>10/9/2017</a:t>
             </a:fld>
             <a:endParaRPr lang="en-US"/>
           </a:p>
@@ -1340,7 +1340,7 @@
             <a:fld id="{1D8BD707-D9CF-40AE-B4C6-C98DA3205C09}" type="datetimeFigureOut">
               <a:rPr lang="en-US" smtClean="0"/>
               <a:pPr/>
-              <a:t>10/3/2017</a:t>
+              <a:t>10/9/2017</a:t>
             </a:fld>
             <a:endParaRPr lang="en-US"/>
           </a:p>
@@ -1756,7 +1756,7 @@
             <a:fld id="{1D8BD707-D9CF-40AE-B4C6-C98DA3205C09}" type="datetimeFigureOut">
               <a:rPr lang="en-US" smtClean="0"/>
               <a:pPr/>
-              <a:t>10/3/2017</a:t>
+              <a:t>10/9/2017</a:t>
             </a:fld>
             <a:endParaRPr lang="en-US"/>
           </a:p>
@@ -1870,7 +1870,7 @@
             <a:fld id="{1D8BD707-D9CF-40AE-B4C6-C98DA3205C09}" type="datetimeFigureOut">
               <a:rPr lang="en-US" smtClean="0"/>
               <a:pPr/>
-              <a:t>10/3/2017</a:t>
+              <a:t>10/9/2017</a:t>
             </a:fld>
             <a:endParaRPr lang="en-US"/>
           </a:p>
@@ -1962,7 +1962,7 @@
             <a:fld id="{1D8BD707-D9CF-40AE-B4C6-C98DA3205C09}" type="datetimeFigureOut">
               <a:rPr lang="en-US" smtClean="0"/>
               <a:pPr/>
-              <a:t>10/3/2017</a:t>
+              <a:t>10/9/2017</a:t>
             </a:fld>
             <a:endParaRPr lang="en-US"/>
           </a:p>
@@ -2234,7 +2234,7 @@
             <a:fld id="{1D8BD707-D9CF-40AE-B4C6-C98DA3205C09}" type="datetimeFigureOut">
               <a:rPr lang="en-US" smtClean="0"/>
               <a:pPr/>
-              <a:t>10/3/2017</a:t>
+              <a:t>10/9/2017</a:t>
             </a:fld>
             <a:endParaRPr lang="en-US"/>
           </a:p>
@@ -2483,7 +2483,7 @@
             <a:fld id="{1D8BD707-D9CF-40AE-B4C6-C98DA3205C09}" type="datetimeFigureOut">
               <a:rPr lang="en-US" smtClean="0"/>
               <a:pPr/>
-              <a:t>10/3/2017</a:t>
+              <a:t>10/9/2017</a:t>
             </a:fld>
             <a:endParaRPr lang="en-US"/>
           </a:p>
@@ -2691,7 +2691,7 @@
             <a:fld id="{1D8BD707-D9CF-40AE-B4C6-C98DA3205C09}" type="datetimeFigureOut">
               <a:rPr lang="en-US" smtClean="0"/>
               <a:pPr/>
-              <a:t>10/3/2017</a:t>
+              <a:t>10/9/2017</a:t>
             </a:fld>
             <a:endParaRPr lang="en-US"/>
           </a:p>
@@ -3368,15 +3368,16 @@
           </a:bodyPr>
           <a:lstStyle/>
           <a:p>
-            <a:r>
-              <a:rPr lang="en-GB" sz="2100"/>
-              <a:t>If I need to tell you then get out.</a:t>
-            </a:r>
-          </a:p>
-          <a:p>
-            <a:r>
-              <a:rPr lang="en-GB" sz="2100"/>
-              <a:t>Spyro is a 3D adventure platformer where you play as a dragon trying to save the world from an evil tyrant that has turned all the other dragons into stone.</a:t>
+            <a:endParaRPr lang="en-GB" sz="2100" dirty="0"/>
+          </a:p>
+          <a:p>
+            <a:r>
+              <a:rPr lang="en-GB" sz="2100" dirty="0" err="1"/>
+              <a:t>Spyro</a:t>
+            </a:r>
+            <a:r>
+              <a:rPr lang="en-GB" sz="2100" dirty="0"/>
+              <a:t> is a 3D adventure platformer where you play as a dragon trying to save the world from an evil tyrant that has turned all the other dragons into stone.</a:t>
             </a:r>
           </a:p>
         </p:txBody>
@@ -3574,41 +3575,56 @@
           <a:lstStyle/>
           <a:p>
             <a:r>
-              <a:rPr lang="en-GB" sz="2100"/>
-              <a:t>I will be turning Spyro into a 2D platform adventure.</a:t>
-            </a:r>
-          </a:p>
-          <a:p>
-            <a:r>
-              <a:rPr lang="en-GB" sz="2100"/>
+              <a:rPr lang="en-GB" sz="2100" dirty="0"/>
+              <a:t>I will be turning </a:t>
+            </a:r>
+            <a:r>
+              <a:rPr lang="en-GB" sz="2100" dirty="0" err="1"/>
+              <a:t>Spyro</a:t>
+            </a:r>
+            <a:r>
+              <a:rPr lang="en-GB" sz="2100" dirty="0"/>
+              <a:t> into a 2D platform adventure.</a:t>
+            </a:r>
+          </a:p>
+          <a:p>
+            <a:r>
+              <a:rPr lang="en-GB" sz="2100" dirty="0"/>
               <a:t>I will be keeping the core mechanics:</a:t>
             </a:r>
           </a:p>
           <a:p>
             <a:pPr lvl="2"/>
             <a:r>
-              <a:rPr lang="en-GB" sz="2100"/>
+              <a:rPr lang="en-GB" sz="2100" dirty="0"/>
               <a:t>Collecting Gems</a:t>
             </a:r>
           </a:p>
           <a:p>
             <a:pPr lvl="2"/>
             <a:r>
-              <a:rPr lang="en-GB" sz="2100"/>
+              <a:rPr lang="en-GB" sz="2100" dirty="0"/>
               <a:t>Jumping</a:t>
             </a:r>
           </a:p>
           <a:p>
             <a:pPr lvl="2"/>
             <a:r>
-              <a:rPr lang="en-GB" sz="2100"/>
+              <a:rPr lang="en-GB" sz="2100" dirty="0"/>
               <a:t>Breathing Fire</a:t>
             </a:r>
           </a:p>
           <a:p>
             <a:pPr lvl="2"/>
             <a:r>
-              <a:rPr lang="en-GB" sz="2100"/>
+              <a:rPr lang="en-GB" sz="2100" dirty="0"/>
+              <a:t>Enemies</a:t>
+            </a:r>
+          </a:p>
+          <a:p>
+            <a:pPr lvl="2"/>
+            <a:r>
+              <a:rPr lang="en-GB" sz="2100" dirty="0"/>
               <a:t>Gliding (Stretch Goal)</a:t>
             </a:r>
           </a:p>

</xml_diff>